<commit_message>
added a bsub file and tweaked the powerpoint
</commit_message>
<xml_diff>
--- a/triads-ris-workshop.pptx
+++ b/triads-ris-workshop.pptx
@@ -206,7 +206,7 @@
           <a:p>
             <a:fld id="{0EB23CB4-0EBB-7E43-AEC8-D5ADDA650247}" type="datetimeFigureOut">
               <a:rPr lang="en-US" smtClean="0"/>
-              <a:t>11/4/24</a:t>
+              <a:t>11/5/24</a:t>
             </a:fld>
             <a:endParaRPr lang="en-US"/>
           </a:p>
@@ -790,6 +790,90 @@
           <a:p>
             <a:fld id="{C2FD1589-7E77-6440-8706-C35CABE01F1C}" type="slidenum">
               <a:rPr lang="en-US" smtClean="0"/>
+              <a:t>6</a:t>
+            </a:fld>
+            <a:endParaRPr lang="en-US"/>
+          </a:p>
+        </p:txBody>
+      </p:sp>
+    </p:spTree>
+    <p:extLst>
+      <p:ext uri="{BB962C8B-B14F-4D97-AF65-F5344CB8AC3E}">
+        <p14:creationId xmlns:p14="http://schemas.microsoft.com/office/powerpoint/2010/main" val="2011022376"/>
+      </p:ext>
+    </p:extLst>
+  </p:cSld>
+  <p:clrMapOvr>
+    <a:masterClrMapping/>
+  </p:clrMapOvr>
+</p:notes>
+</file>
+
+<file path=ppt/notesSlides/notesSlide5.xml><?xml version="1.0" encoding="utf-8"?>
+<p:notes xmlns:a="http://schemas.openxmlformats.org/drawingml/2006/main" xmlns:r="http://schemas.openxmlformats.org/officeDocument/2006/relationships" xmlns:p="http://schemas.openxmlformats.org/presentationml/2006/main">
+  <p:cSld>
+    <p:spTree>
+      <p:nvGrpSpPr>
+        <p:cNvPr id="1" name=""/>
+        <p:cNvGrpSpPr/>
+        <p:nvPr/>
+      </p:nvGrpSpPr>
+      <p:grpSpPr>
+        <a:xfrm>
+          <a:off x="0" y="0"/>
+          <a:ext cx="0" cy="0"/>
+          <a:chOff x="0" y="0"/>
+          <a:chExt cx="0" cy="0"/>
+        </a:xfrm>
+      </p:grpSpPr>
+      <p:sp>
+        <p:nvSpPr>
+          <p:cNvPr id="2" name="Slide Image Placeholder 1"/>
+          <p:cNvSpPr>
+            <a:spLocks noGrp="1" noRot="1" noChangeAspect="1"/>
+          </p:cNvSpPr>
+          <p:nvPr>
+            <p:ph type="sldImg"/>
+          </p:nvPr>
+        </p:nvSpPr>
+        <p:spPr/>
+      </p:sp>
+      <p:sp>
+        <p:nvSpPr>
+          <p:cNvPr id="3" name="Notes Placeholder 2"/>
+          <p:cNvSpPr>
+            <a:spLocks noGrp="1"/>
+          </p:cNvSpPr>
+          <p:nvPr>
+            <p:ph type="body" idx="1"/>
+          </p:nvPr>
+        </p:nvSpPr>
+        <p:spPr/>
+        <p:txBody>
+          <a:bodyPr/>
+          <a:lstStyle/>
+          <a:p>
+            <a:endParaRPr lang="en-US" dirty="0"/>
+          </a:p>
+        </p:txBody>
+      </p:sp>
+      <p:sp>
+        <p:nvSpPr>
+          <p:cNvPr id="4" name="Slide Number Placeholder 3"/>
+          <p:cNvSpPr>
+            <a:spLocks noGrp="1"/>
+          </p:cNvSpPr>
+          <p:nvPr>
+            <p:ph type="sldNum" sz="quarter" idx="5"/>
+          </p:nvPr>
+        </p:nvSpPr>
+        <p:spPr/>
+        <p:txBody>
+          <a:bodyPr/>
+          <a:lstStyle/>
+          <a:p>
+            <a:fld id="{C2FD1589-7E77-6440-8706-C35CABE01F1C}" type="slidenum">
+              <a:rPr lang="en-US" smtClean="0"/>
               <a:t>10</a:t>
             </a:fld>
             <a:endParaRPr lang="en-US"/>
@@ -956,7 +1040,7 @@
           <a:p>
             <a:fld id="{2B281CE9-E0DF-2844-850D-DF93F0722CA0}" type="datetimeFigureOut">
               <a:rPr lang="en-US" smtClean="0"/>
-              <a:t>11/4/24</a:t>
+              <a:t>11/5/24</a:t>
             </a:fld>
             <a:endParaRPr lang="en-US"/>
           </a:p>
@@ -1154,7 +1238,7 @@
           <a:p>
             <a:fld id="{2B281CE9-E0DF-2844-850D-DF93F0722CA0}" type="datetimeFigureOut">
               <a:rPr lang="en-US" smtClean="0"/>
-              <a:t>11/4/24</a:t>
+              <a:t>11/5/24</a:t>
             </a:fld>
             <a:endParaRPr lang="en-US"/>
           </a:p>
@@ -1362,7 +1446,7 @@
           <a:p>
             <a:fld id="{2B281CE9-E0DF-2844-850D-DF93F0722CA0}" type="datetimeFigureOut">
               <a:rPr lang="en-US" smtClean="0"/>
-              <a:t>11/4/24</a:t>
+              <a:t>11/5/24</a:t>
             </a:fld>
             <a:endParaRPr lang="en-US"/>
           </a:p>
@@ -1560,7 +1644,7 @@
           <a:p>
             <a:fld id="{2B281CE9-E0DF-2844-850D-DF93F0722CA0}" type="datetimeFigureOut">
               <a:rPr lang="en-US" smtClean="0"/>
-              <a:t>11/4/24</a:t>
+              <a:t>11/5/24</a:t>
             </a:fld>
             <a:endParaRPr lang="en-US"/>
           </a:p>
@@ -1835,7 +1919,7 @@
           <a:p>
             <a:fld id="{2B281CE9-E0DF-2844-850D-DF93F0722CA0}" type="datetimeFigureOut">
               <a:rPr lang="en-US" smtClean="0"/>
-              <a:t>11/4/24</a:t>
+              <a:t>11/5/24</a:t>
             </a:fld>
             <a:endParaRPr lang="en-US"/>
           </a:p>
@@ -2100,7 +2184,7 @@
           <a:p>
             <a:fld id="{2B281CE9-E0DF-2844-850D-DF93F0722CA0}" type="datetimeFigureOut">
               <a:rPr lang="en-US" smtClean="0"/>
-              <a:t>11/4/24</a:t>
+              <a:t>11/5/24</a:t>
             </a:fld>
             <a:endParaRPr lang="en-US"/>
           </a:p>
@@ -2512,7 +2596,7 @@
           <a:p>
             <a:fld id="{2B281CE9-E0DF-2844-850D-DF93F0722CA0}" type="datetimeFigureOut">
               <a:rPr lang="en-US" smtClean="0"/>
-              <a:t>11/4/24</a:t>
+              <a:t>11/5/24</a:t>
             </a:fld>
             <a:endParaRPr lang="en-US"/>
           </a:p>
@@ -2653,7 +2737,7 @@
           <a:p>
             <a:fld id="{2B281CE9-E0DF-2844-850D-DF93F0722CA0}" type="datetimeFigureOut">
               <a:rPr lang="en-US" smtClean="0"/>
-              <a:t>11/4/24</a:t>
+              <a:t>11/5/24</a:t>
             </a:fld>
             <a:endParaRPr lang="en-US"/>
           </a:p>
@@ -2766,7 +2850,7 @@
           <a:p>
             <a:fld id="{2B281CE9-E0DF-2844-850D-DF93F0722CA0}" type="datetimeFigureOut">
               <a:rPr lang="en-US" smtClean="0"/>
-              <a:t>11/4/24</a:t>
+              <a:t>11/5/24</a:t>
             </a:fld>
             <a:endParaRPr lang="en-US"/>
           </a:p>
@@ -3077,7 +3161,7 @@
           <a:p>
             <a:fld id="{2B281CE9-E0DF-2844-850D-DF93F0722CA0}" type="datetimeFigureOut">
               <a:rPr lang="en-US" smtClean="0"/>
-              <a:t>11/4/24</a:t>
+              <a:t>11/5/24</a:t>
             </a:fld>
             <a:endParaRPr lang="en-US"/>
           </a:p>
@@ -3365,7 +3449,7 @@
           <a:p>
             <a:fld id="{2B281CE9-E0DF-2844-850D-DF93F0722CA0}" type="datetimeFigureOut">
               <a:rPr lang="en-US" smtClean="0"/>
-              <a:t>11/4/24</a:t>
+              <a:t>11/5/24</a:t>
             </a:fld>
             <a:endParaRPr lang="en-US"/>
           </a:p>
@@ -3606,7 +3690,7 @@
           <a:p>
             <a:fld id="{2B281CE9-E0DF-2844-850D-DF93F0722CA0}" type="datetimeFigureOut">
               <a:rPr lang="en-US" smtClean="0"/>
-              <a:t>11/4/24</a:t>
+              <a:t>11/5/24</a:t>
             </a:fld>
             <a:endParaRPr lang="en-US"/>
           </a:p>
@@ -4463,7 +4547,7 @@
         <p:spPr/>
         <p:txBody>
           <a:bodyPr>
-            <a:normAutofit lnSpcReduction="10000"/>
+            <a:normAutofit/>
           </a:bodyPr>
           <a:lstStyle/>
           <a:p>
@@ -4487,7 +4571,7 @@
           <a:p>
             <a:r>
               <a:rPr lang="en-US" dirty="0"/>
-              <a:t>Running a basic job</a:t>
+              <a:t>Upload some code to the RIS</a:t>
             </a:r>
           </a:p>
           <a:p>
@@ -4513,28 +4597,9 @@
             </a:r>
           </a:p>
           <a:p>
-            <a:pPr lvl="1"/>
-            <a:r>
-              <a:rPr lang="en-US" b="1" dirty="0"/>
-              <a:t>Run a program on the RIS</a:t>
-            </a:r>
-          </a:p>
-          <a:p>
-            <a:pPr lvl="1"/>
-            <a:r>
-              <a:rPr lang="en-US" b="1" dirty="0"/>
-              <a:t>Update a </a:t>
-            </a:r>
-            <a:r>
-              <a:rPr lang="en-US" b="1" dirty="0" err="1"/>
-              <a:t>Dockerfile</a:t>
-            </a:r>
-            <a:r>
-              <a:rPr lang="en-US" b="1" dirty="0"/>
-              <a:t> to include a library you might need</a:t>
-            </a:r>
-          </a:p>
-          <a:p>
+            <a:pPr marL="0" indent="0">
+              <a:buNone/>
+            </a:pPr>
             <a:endParaRPr lang="en-US" b="1" dirty="0"/>
           </a:p>
         </p:txBody>
@@ -4794,6 +4859,84 @@
           </a:p>
         </p:txBody>
       </p:sp>
+      <p:sp>
+        <p:nvSpPr>
+          <p:cNvPr id="3" name="Content Placeholder 2">
+            <a:extLst>
+              <a:ext uri="{FF2B5EF4-FFF2-40B4-BE49-F238E27FC236}">
+                <a16:creationId xmlns:a16="http://schemas.microsoft.com/office/drawing/2014/main" id="{AB27AE7E-F2C1-6124-D42D-3196E3146CD2}"/>
+              </a:ext>
+            </a:extLst>
+          </p:cNvPr>
+          <p:cNvSpPr>
+            <a:spLocks noGrp="1"/>
+          </p:cNvSpPr>
+          <p:nvPr>
+            <p:ph idx="1"/>
+          </p:nvPr>
+        </p:nvSpPr>
+        <p:spPr>
+          <a:xfrm>
+            <a:off x="838200" y="1825625"/>
+            <a:ext cx="10515600" cy="4351338"/>
+          </a:xfrm>
+        </p:spPr>
+        <p:txBody>
+          <a:bodyPr/>
+          <a:lstStyle/>
+          <a:p>
+            <a:r>
+              <a:rPr lang="en-US" dirty="0"/>
+              <a:t>For this class we all have access to storage1 and a group and a queue!</a:t>
+            </a:r>
+          </a:p>
+          <a:p>
+            <a:pPr marL="0" indent="0">
+              <a:buNone/>
+            </a:pPr>
+            <a:r>
+              <a:rPr lang="en-US" dirty="0"/>
+              <a:t> /storage1/fs1/workshops/Active/</a:t>
+            </a:r>
+            <a:r>
+              <a:rPr lang="en-US" dirty="0" err="1"/>
+              <a:t>HPCatWashU</a:t>
+            </a:r>
+            <a:r>
+              <a:rPr lang="en-US" dirty="0"/>
+              <a:t>/</a:t>
+            </a:r>
+          </a:p>
+          <a:p>
+            <a:pPr marL="0" indent="0">
+              <a:buNone/>
+            </a:pPr>
+            <a:r>
+              <a:rPr lang="en-US" dirty="0"/>
+              <a:t>Queue -&gt; workshop </a:t>
+            </a:r>
+            <a:endParaRPr lang="en-US" dirty="0">
+              <a:solidFill>
+                <a:srgbClr val="D1D7E0"/>
+              </a:solidFill>
+              <a:latin typeface="-apple-system"/>
+            </a:endParaRPr>
+          </a:p>
+          <a:p>
+            <a:pPr marL="0" indent="0">
+              <a:buNone/>
+            </a:pPr>
+            <a:r>
+              <a:rPr lang="en-US" dirty="0"/>
+              <a:t>Group -&gt; compute-workshop</a:t>
+            </a:r>
+            <a:br>
+              <a:rPr lang="en-US" dirty="0"/>
+            </a:br>
+            <a:endParaRPr lang="en-US" dirty="0"/>
+          </a:p>
+        </p:txBody>
+      </p:sp>
     </p:spTree>
     <p:extLst>
       <p:ext uri="{BB962C8B-B14F-4D97-AF65-F5344CB8AC3E}">
@@ -4849,6 +4992,128 @@
               <a:rPr lang="en-US" dirty="0"/>
               <a:t>Task 2 – Connecting to the RIS</a:t>
             </a:r>
+          </a:p>
+        </p:txBody>
+      </p:sp>
+      <p:sp>
+        <p:nvSpPr>
+          <p:cNvPr id="3" name="Content Placeholder 2">
+            <a:extLst>
+              <a:ext uri="{FF2B5EF4-FFF2-40B4-BE49-F238E27FC236}">
+                <a16:creationId xmlns:a16="http://schemas.microsoft.com/office/drawing/2014/main" id="{9D53F08B-FA86-3802-3125-DC7C1E51FF88}"/>
+              </a:ext>
+            </a:extLst>
+          </p:cNvPr>
+          <p:cNvSpPr>
+            <a:spLocks noGrp="1"/>
+          </p:cNvSpPr>
+          <p:nvPr>
+            <p:ph idx="1"/>
+          </p:nvPr>
+        </p:nvSpPr>
+        <p:spPr>
+          <a:xfrm>
+            <a:off x="838200" y="1825625"/>
+            <a:ext cx="10515600" cy="4351338"/>
+          </a:xfrm>
+        </p:spPr>
+        <p:txBody>
+          <a:bodyPr/>
+          <a:lstStyle/>
+          <a:p>
+            <a:pPr marL="0" indent="0" algn="l">
+              <a:buNone/>
+            </a:pPr>
+            <a:r>
+              <a:rPr lang="en-US" dirty="0"/>
+              <a:t>We’re going to access it using SSH.</a:t>
+            </a:r>
+          </a:p>
+          <a:p>
+            <a:pPr marL="0" indent="0" algn="l">
+              <a:buNone/>
+            </a:pPr>
+            <a:r>
+              <a:rPr lang="en-US" dirty="0" err="1"/>
+              <a:t>ssh</a:t>
+            </a:r>
+            <a:r>
+              <a:rPr lang="en-US" dirty="0"/>
+              <a:t> &lt;</a:t>
+            </a:r>
+            <a:r>
+              <a:rPr lang="en-US" dirty="0" err="1"/>
+              <a:t>wustl</a:t>
+            </a:r>
+            <a:r>
+              <a:rPr lang="en-US" dirty="0"/>
+              <a:t>-key&gt;@compute1-client-&lt;N&gt;.</a:t>
+            </a:r>
+            <a:r>
+              <a:rPr lang="en-US" dirty="0" err="1"/>
+              <a:t>ris.wustl.edu</a:t>
+            </a:r>
+            <a:endParaRPr lang="en-US" dirty="0"/>
+          </a:p>
+          <a:p>
+            <a:pPr marL="0" indent="0" algn="l">
+              <a:buNone/>
+            </a:pPr>
+            <a:r>
+              <a:rPr lang="en-US" dirty="0"/>
+              <a:t>where &lt;key&gt; is your official WUSTL key, and &lt;N&gt; can be any number from 1 to 4</a:t>
+            </a:r>
+          </a:p>
+          <a:p>
+            <a:pPr marL="0" indent="0" algn="l">
+              <a:buNone/>
+            </a:pPr>
+            <a:endParaRPr lang="en-US" dirty="0"/>
+          </a:p>
+          <a:p>
+            <a:pPr marL="0" indent="0" algn="l">
+              <a:buNone/>
+            </a:pPr>
+            <a:r>
+              <a:rPr lang="en-US" dirty="0"/>
+              <a:t>Windows users – Download Putty</a:t>
+            </a:r>
+          </a:p>
+          <a:p>
+            <a:pPr marL="0" indent="0" algn="l">
+              <a:buNone/>
+            </a:pPr>
+            <a:r>
+              <a:rPr lang="en-US" dirty="0">
+                <a:hlinkClick r:id="rId2"/>
+              </a:rPr>
+              <a:t>https://tinyurl.com/mgyxbev</a:t>
+            </a:r>
+            <a:r>
+              <a:rPr lang="en-US" dirty="0"/>
+              <a:t> </a:t>
+            </a:r>
+            <a:br>
+              <a:rPr lang="en-US" dirty="0"/>
+            </a:br>
+            <a:r>
+              <a:rPr lang="en-US" dirty="0"/>
+              <a:t> </a:t>
+            </a:r>
+          </a:p>
+          <a:p>
+            <a:pPr marL="0" indent="0" algn="l">
+              <a:buNone/>
+            </a:pPr>
+            <a:r>
+              <a:rPr lang="en-US" dirty="0"/>
+              <a:t>https://</a:t>
+            </a:r>
+            <a:r>
+              <a:rPr lang="en-US" dirty="0" err="1"/>
+              <a:t>ood.ris.wustl.edu</a:t>
+            </a:r>
+            <a:endParaRPr lang="en-US" dirty="0"/>
           </a:p>
         </p:txBody>
       </p:sp>

</xml_diff>